<commit_message>
Flushed out all slides with empty content.
</commit_message>
<xml_diff>
--- a/Git & Github.pptx
+++ b/Git & Github.pptx
@@ -16,6 +16,9 @@
     <p:sldId id="266" r:id="rId10"/>
     <p:sldId id="267" r:id="rId11"/>
     <p:sldId id="269" r:id="rId12"/>
+    <p:sldId id="270" r:id="rId13"/>
+    <p:sldId id="271" r:id="rId14"/>
+    <p:sldId id="272" r:id="rId15"/>
   </p:sldIdLst>
   <p:sldSz cx="9144000" cy="6858000" type="screen4x3"/>
   <p:notesSz cx="6858000" cy="9144000"/>
@@ -210,7 +213,6 @@
               <a:rPr lang="en-US" noProof="0" smtClean="0"/>
               <a:t>Click to edit Master subtitle style</a:t>
             </a:r>
-            <a:endParaRPr lang="en-US" noProof="0" smtClean="0"/>
           </a:p>
         </p:txBody>
       </p:sp>
@@ -2785,7 +2787,6 @@
               <a:rPr lang="en-US" smtClean="0"/>
               <a:t>Click to edit Master title style</a:t>
             </a:r>
-            <a:endParaRPr lang="en-US" smtClean="0"/>
           </a:p>
         </p:txBody>
       </p:sp>
@@ -3789,6 +3790,277 @@
 </p:sld>
 </file>
 
+<file path=ppt/slides/slide12.xml><?xml version="1.0" encoding="utf-8"?>
+<p:sld xmlns:a="http://schemas.openxmlformats.org/drawingml/2006/main" xmlns:r="http://schemas.openxmlformats.org/officeDocument/2006/relationships" xmlns:p="http://schemas.openxmlformats.org/presentationml/2006/main">
+  <p:cSld>
+    <p:spTree>
+      <p:nvGrpSpPr>
+        <p:cNvPr id="1" name=""/>
+        <p:cNvGrpSpPr/>
+        <p:nvPr/>
+      </p:nvGrpSpPr>
+      <p:grpSpPr>
+        <a:xfrm>
+          <a:off x="0" y="0"/>
+          <a:ext cx="0" cy="0"/>
+          <a:chOff x="0" y="0"/>
+          <a:chExt cx="0" cy="0"/>
+        </a:xfrm>
+      </p:grpSpPr>
+      <p:sp>
+        <p:nvSpPr>
+          <p:cNvPr id="2" name="Title 1"/>
+          <p:cNvSpPr>
+            <a:spLocks noGrp="1"/>
+          </p:cNvSpPr>
+          <p:nvPr>
+            <p:ph type="title"/>
+          </p:nvPr>
+        </p:nvSpPr>
+        <p:spPr/>
+        <p:txBody>
+          <a:bodyPr/>
+          <a:lstStyle/>
+          <a:p>
+            <a:r>
+              <a:rPr lang="en-US" dirty="0" err="1" smtClean="0"/>
+              <a:t>GitHub</a:t>
+            </a:r>
+            <a:r>
+              <a:rPr lang="en-US" dirty="0" smtClean="0"/>
+              <a:t> Client - GUI</a:t>
+            </a:r>
+            <a:endParaRPr lang="en-US" dirty="0"/>
+          </a:p>
+        </p:txBody>
+      </p:sp>
+      <p:sp>
+        <p:nvSpPr>
+          <p:cNvPr id="4" name="Content Placeholder 3"/>
+          <p:cNvSpPr>
+            <a:spLocks noGrp="1"/>
+          </p:cNvSpPr>
+          <p:nvPr>
+            <p:ph sz="half" idx="1"/>
+          </p:nvPr>
+        </p:nvSpPr>
+        <p:spPr/>
+        <p:txBody>
+          <a:bodyPr/>
+          <a:lstStyle/>
+          <a:p>
+            <a:r>
+              <a:rPr lang="en-US" dirty="0" smtClean="0"/>
+              <a:t>Only works with </a:t>
+            </a:r>
+            <a:r>
+              <a:rPr lang="en-US" dirty="0" err="1" smtClean="0"/>
+              <a:t>GitHub</a:t>
+            </a:r>
+            <a:r>
+              <a:rPr lang="en-US" dirty="0" smtClean="0"/>
+              <a:t>.</a:t>
+            </a:r>
+          </a:p>
+          <a:p>
+            <a:r>
+              <a:rPr lang="en-US" dirty="0" smtClean="0"/>
+              <a:t>Much easier to use and navigate.</a:t>
+            </a:r>
+          </a:p>
+          <a:p>
+            <a:r>
+              <a:rPr lang="en-US" dirty="0" smtClean="0"/>
+              <a:t>Mac and Windows versions.</a:t>
+            </a:r>
+          </a:p>
+        </p:txBody>
+      </p:sp>
+      <p:sp>
+        <p:nvSpPr>
+          <p:cNvPr id="5" name="Content Placeholder 4"/>
+          <p:cNvSpPr>
+            <a:spLocks noGrp="1"/>
+          </p:cNvSpPr>
+          <p:nvPr>
+            <p:ph sz="half" idx="2"/>
+          </p:nvPr>
+        </p:nvSpPr>
+        <p:spPr/>
+        <p:txBody>
+          <a:bodyPr/>
+          <a:lstStyle/>
+          <a:p>
+            <a:endParaRPr lang="en-US"/>
+          </a:p>
+        </p:txBody>
+      </p:sp>
+    </p:spTree>
+    <p:extLst>
+      <p:ext uri="{BB962C8B-B14F-4D97-AF65-F5344CB8AC3E}">
+        <p14:creationId xmlns:p14="http://schemas.microsoft.com/office/powerpoint/2010/main" val="3101438264"/>
+      </p:ext>
+    </p:extLst>
+  </p:cSld>
+  <p:clrMapOvr>
+    <a:masterClrMapping/>
+  </p:clrMapOvr>
+  <p:transition spd="med">
+    <p:fade thruBlk="1"/>
+  </p:transition>
+</p:sld>
+</file>
+
+<file path=ppt/slides/slide13.xml><?xml version="1.0" encoding="utf-8"?>
+<p:sld xmlns:a="http://schemas.openxmlformats.org/drawingml/2006/main" xmlns:r="http://schemas.openxmlformats.org/officeDocument/2006/relationships" xmlns:p="http://schemas.openxmlformats.org/presentationml/2006/main">
+  <p:cSld>
+    <p:spTree>
+      <p:nvGrpSpPr>
+        <p:cNvPr id="1" name=""/>
+        <p:cNvGrpSpPr/>
+        <p:nvPr/>
+      </p:nvGrpSpPr>
+      <p:grpSpPr>
+        <a:xfrm>
+          <a:off x="0" y="0"/>
+          <a:ext cx="0" cy="0"/>
+          <a:chOff x="0" y="0"/>
+          <a:chExt cx="0" cy="0"/>
+        </a:xfrm>
+      </p:grpSpPr>
+      <p:sp>
+        <p:nvSpPr>
+          <p:cNvPr id="2" name="Title 1"/>
+          <p:cNvSpPr>
+            <a:spLocks noGrp="1"/>
+          </p:cNvSpPr>
+          <p:nvPr>
+            <p:ph type="title"/>
+          </p:nvPr>
+        </p:nvSpPr>
+        <p:spPr/>
+        <p:txBody>
+          <a:bodyPr/>
+          <a:lstStyle/>
+          <a:p>
+            <a:r>
+              <a:rPr lang="en-US" dirty="0" err="1" smtClean="0"/>
+              <a:t>Rstudio</a:t>
+            </a:r>
+            <a:endParaRPr lang="en-US" dirty="0"/>
+          </a:p>
+        </p:txBody>
+      </p:sp>
+      <p:sp>
+        <p:nvSpPr>
+          <p:cNvPr id="5" name="Content Placeholder 4"/>
+          <p:cNvSpPr>
+            <a:spLocks noGrp="1"/>
+          </p:cNvSpPr>
+          <p:nvPr>
+            <p:ph idx="1"/>
+          </p:nvPr>
+        </p:nvSpPr>
+        <p:spPr/>
+        <p:txBody>
+          <a:bodyPr/>
+          <a:lstStyle/>
+          <a:p>
+            <a:endParaRPr lang="en-US"/>
+          </a:p>
+        </p:txBody>
+      </p:sp>
+    </p:spTree>
+    <p:extLst>
+      <p:ext uri="{BB962C8B-B14F-4D97-AF65-F5344CB8AC3E}">
+        <p14:creationId xmlns:p14="http://schemas.microsoft.com/office/powerpoint/2010/main" val="4254214701"/>
+      </p:ext>
+    </p:extLst>
+  </p:cSld>
+  <p:clrMapOvr>
+    <a:masterClrMapping/>
+  </p:clrMapOvr>
+  <p:transition spd="med">
+    <p:fade thruBlk="1"/>
+  </p:transition>
+</p:sld>
+</file>
+
+<file path=ppt/slides/slide14.xml><?xml version="1.0" encoding="utf-8"?>
+<p:sld xmlns:a="http://schemas.openxmlformats.org/drawingml/2006/main" xmlns:r="http://schemas.openxmlformats.org/officeDocument/2006/relationships" xmlns:p="http://schemas.openxmlformats.org/presentationml/2006/main">
+  <p:cSld>
+    <p:spTree>
+      <p:nvGrpSpPr>
+        <p:cNvPr id="1" name=""/>
+        <p:cNvGrpSpPr/>
+        <p:nvPr/>
+      </p:nvGrpSpPr>
+      <p:grpSpPr>
+        <a:xfrm>
+          <a:off x="0" y="0"/>
+          <a:ext cx="0" cy="0"/>
+          <a:chOff x="0" y="0"/>
+          <a:chExt cx="0" cy="0"/>
+        </a:xfrm>
+      </p:grpSpPr>
+      <p:sp>
+        <p:nvSpPr>
+          <p:cNvPr id="2" name="Title 1"/>
+          <p:cNvSpPr>
+            <a:spLocks noGrp="1"/>
+          </p:cNvSpPr>
+          <p:nvPr>
+            <p:ph type="title"/>
+          </p:nvPr>
+        </p:nvSpPr>
+        <p:spPr/>
+        <p:txBody>
+          <a:bodyPr/>
+          <a:lstStyle/>
+          <a:p>
+            <a:r>
+              <a:rPr lang="en-US" smtClean="0"/>
+              <a:t>QBRC Proposal</a:t>
+            </a:r>
+            <a:endParaRPr lang="en-US" dirty="0"/>
+          </a:p>
+        </p:txBody>
+      </p:sp>
+      <p:sp>
+        <p:nvSpPr>
+          <p:cNvPr id="3" name="Content Placeholder 2"/>
+          <p:cNvSpPr>
+            <a:spLocks noGrp="1"/>
+          </p:cNvSpPr>
+          <p:nvPr>
+            <p:ph idx="1"/>
+          </p:nvPr>
+        </p:nvSpPr>
+        <p:spPr/>
+        <p:txBody>
+          <a:bodyPr/>
+          <a:lstStyle/>
+          <a:p>
+            <a:endParaRPr lang="en-US"/>
+          </a:p>
+        </p:txBody>
+      </p:sp>
+    </p:spTree>
+    <p:extLst>
+      <p:ext uri="{BB962C8B-B14F-4D97-AF65-F5344CB8AC3E}">
+        <p14:creationId xmlns:p14="http://schemas.microsoft.com/office/powerpoint/2010/main" val="4034468156"/>
+      </p:ext>
+    </p:extLst>
+  </p:cSld>
+  <p:clrMapOvr>
+    <a:masterClrMapping/>
+  </p:clrMapOvr>
+  <p:transition spd="med">
+    <p:fade thruBlk="1"/>
+  </p:transition>
+</p:sld>
+</file>
+
 <file path=ppt/slides/slide2.xml><?xml version="1.0" encoding="utf-8"?>
 <p:sld xmlns:a="http://schemas.openxmlformats.org/drawingml/2006/main" xmlns:r="http://schemas.openxmlformats.org/officeDocument/2006/relationships" xmlns:p="http://schemas.openxmlformats.org/presentationml/2006/main">
   <p:cSld>
@@ -3896,7 +4168,14 @@
             <a:pPr lvl="1"/>
             <a:r>
               <a:rPr lang="en-US" dirty="0" err="1" smtClean="0"/>
-              <a:t>RStudio</a:t>
+              <a:t>Rstudio</a:t>
+            </a:r>
+            <a:endParaRPr lang="en-US" dirty="0"/>
+          </a:p>
+          <a:p>
+            <a:r>
+              <a:rPr lang="en-US" dirty="0" smtClean="0"/>
+              <a:t>QBRC Proposal</a:t>
             </a:r>
             <a:endParaRPr lang="en-US" dirty="0" smtClean="0"/>
           </a:p>
@@ -4532,8 +4811,19 @@
           <a:p>
             <a:r>
               <a:rPr lang="en-US" dirty="0" smtClean="0"/>
-              <a:t>“Pull” – Download others’ changes from the server to your working copy.</a:t>
-            </a:r>
+              <a:t>“Pull” – Download others’ changes from the server to your working copy</a:t>
+            </a:r>
+            <a:r>
+              <a:rPr lang="en-US" dirty="0" smtClean="0"/>
+              <a:t>.</a:t>
+            </a:r>
+          </a:p>
+          <a:p>
+            <a:r>
+              <a:rPr lang="en-US" dirty="0" smtClean="0"/>
+              <a:t>“Clone” – The initial time you copy a project from the server.</a:t>
+            </a:r>
+            <a:endParaRPr lang="en-US" dirty="0" smtClean="0"/>
           </a:p>
         </p:txBody>
       </p:sp>

</xml_diff>

<commit_message>
Added Github Client into and notes.
</commit_message>
<xml_diff>
--- a/Git & Github.pptx
+++ b/Git & Github.pptx
@@ -4,6 +4,9 @@
   <p:sldMasterIdLst>
     <p:sldMasterId id="2147483660" r:id="rId1"/>
   </p:sldMasterIdLst>
+  <p:notesMasterIdLst>
+    <p:notesMasterId r:id="rId16"/>
+  </p:notesMasterIdLst>
   <p:sldIdLst>
     <p:sldId id="256" r:id="rId2"/>
     <p:sldId id="257" r:id="rId3"/>
@@ -118,6 +121,574 @@
     </a:lvl9pPr>
   </p:defaultTextStyle>
 </p:presentation>
+</file>
+
+<file path=ppt/notesMasters/notesMaster1.xml><?xml version="1.0" encoding="utf-8"?>
+<p:notesMaster xmlns:a="http://schemas.openxmlformats.org/drawingml/2006/main" xmlns:r="http://schemas.openxmlformats.org/officeDocument/2006/relationships" xmlns:p="http://schemas.openxmlformats.org/presentationml/2006/main">
+  <p:cSld>
+    <p:bg>
+      <p:bgRef idx="1001">
+        <a:schemeClr val="bg1"/>
+      </p:bgRef>
+    </p:bg>
+    <p:spTree>
+      <p:nvGrpSpPr>
+        <p:cNvPr id="1" name=""/>
+        <p:cNvGrpSpPr/>
+        <p:nvPr/>
+      </p:nvGrpSpPr>
+      <p:grpSpPr>
+        <a:xfrm>
+          <a:off x="0" y="0"/>
+          <a:ext cx="0" cy="0"/>
+          <a:chOff x="0" y="0"/>
+          <a:chExt cx="0" cy="0"/>
+        </a:xfrm>
+      </p:grpSpPr>
+      <p:sp>
+        <p:nvSpPr>
+          <p:cNvPr id="2" name="Header Placeholder 1"/>
+          <p:cNvSpPr>
+            <a:spLocks noGrp="1"/>
+          </p:cNvSpPr>
+          <p:nvPr>
+            <p:ph type="hdr" sz="quarter"/>
+          </p:nvPr>
+        </p:nvSpPr>
+        <p:spPr>
+          <a:xfrm>
+            <a:off x="0" y="0"/>
+            <a:ext cx="2971800" cy="457200"/>
+          </a:xfrm>
+          <a:prstGeom prst="rect">
+            <a:avLst/>
+          </a:prstGeom>
+        </p:spPr>
+        <p:txBody>
+          <a:bodyPr vert="horz" lIns="91440" tIns="45720" rIns="91440" bIns="45720" rtlCol="0"/>
+          <a:lstStyle>
+            <a:lvl1pPr algn="l">
+              <a:defRPr sz="1200"/>
+            </a:lvl1pPr>
+          </a:lstStyle>
+          <a:p>
+            <a:endParaRPr lang="en-US"/>
+          </a:p>
+        </p:txBody>
+      </p:sp>
+      <p:sp>
+        <p:nvSpPr>
+          <p:cNvPr id="3" name="Date Placeholder 2"/>
+          <p:cNvSpPr>
+            <a:spLocks noGrp="1"/>
+          </p:cNvSpPr>
+          <p:nvPr>
+            <p:ph type="dt" idx="1"/>
+          </p:nvPr>
+        </p:nvSpPr>
+        <p:spPr>
+          <a:xfrm>
+            <a:off x="3884613" y="0"/>
+            <a:ext cx="2971800" cy="457200"/>
+          </a:xfrm>
+          <a:prstGeom prst="rect">
+            <a:avLst/>
+          </a:prstGeom>
+        </p:spPr>
+        <p:txBody>
+          <a:bodyPr vert="horz" lIns="91440" tIns="45720" rIns="91440" bIns="45720" rtlCol="0"/>
+          <a:lstStyle>
+            <a:lvl1pPr algn="r">
+              <a:defRPr sz="1200"/>
+            </a:lvl1pPr>
+          </a:lstStyle>
+          <a:p>
+            <a:fld id="{D5244A09-CE51-45BC-B495-0A38684A10EE}" type="datetimeFigureOut">
+              <a:rPr lang="en-US" smtClean="0"/>
+              <a:t>12/10/2012</a:t>
+            </a:fld>
+            <a:endParaRPr lang="en-US"/>
+          </a:p>
+        </p:txBody>
+      </p:sp>
+      <p:sp>
+        <p:nvSpPr>
+          <p:cNvPr id="4" name="Slide Image Placeholder 3"/>
+          <p:cNvSpPr>
+            <a:spLocks noGrp="1" noRot="1" noChangeAspect="1"/>
+          </p:cNvSpPr>
+          <p:nvPr>
+            <p:ph type="sldImg" idx="2"/>
+          </p:nvPr>
+        </p:nvSpPr>
+        <p:spPr>
+          <a:xfrm>
+            <a:off x="1143000" y="685800"/>
+            <a:ext cx="4572000" cy="3429000"/>
+          </a:xfrm>
+          <a:prstGeom prst="rect">
+            <a:avLst/>
+          </a:prstGeom>
+          <a:noFill/>
+          <a:ln w="12700">
+            <a:solidFill>
+              <a:prstClr val="black"/>
+            </a:solidFill>
+          </a:ln>
+        </p:spPr>
+        <p:txBody>
+          <a:bodyPr vert="horz" lIns="91440" tIns="45720" rIns="91440" bIns="45720" rtlCol="0" anchor="ctr"/>
+          <a:lstStyle/>
+          <a:p>
+            <a:endParaRPr lang="en-US"/>
+          </a:p>
+        </p:txBody>
+      </p:sp>
+      <p:sp>
+        <p:nvSpPr>
+          <p:cNvPr id="5" name="Notes Placeholder 4"/>
+          <p:cNvSpPr>
+            <a:spLocks noGrp="1"/>
+          </p:cNvSpPr>
+          <p:nvPr>
+            <p:ph type="body" sz="quarter" idx="3"/>
+          </p:nvPr>
+        </p:nvSpPr>
+        <p:spPr>
+          <a:xfrm>
+            <a:off x="685800" y="4343400"/>
+            <a:ext cx="5486400" cy="4114800"/>
+          </a:xfrm>
+          <a:prstGeom prst="rect">
+            <a:avLst/>
+          </a:prstGeom>
+        </p:spPr>
+        <p:txBody>
+          <a:bodyPr vert="horz" lIns="91440" tIns="45720" rIns="91440" bIns="45720" rtlCol="0"/>
+          <a:lstStyle/>
+          <a:p>
+            <a:pPr lvl="0"/>
+            <a:r>
+              <a:rPr lang="en-US" smtClean="0"/>
+              <a:t>Click to edit Master text styles</a:t>
+            </a:r>
+          </a:p>
+          <a:p>
+            <a:pPr lvl="1"/>
+            <a:r>
+              <a:rPr lang="en-US" smtClean="0"/>
+              <a:t>Second level</a:t>
+            </a:r>
+          </a:p>
+          <a:p>
+            <a:pPr lvl="2"/>
+            <a:r>
+              <a:rPr lang="en-US" smtClean="0"/>
+              <a:t>Third level</a:t>
+            </a:r>
+          </a:p>
+          <a:p>
+            <a:pPr lvl="3"/>
+            <a:r>
+              <a:rPr lang="en-US" smtClean="0"/>
+              <a:t>Fourth level</a:t>
+            </a:r>
+          </a:p>
+          <a:p>
+            <a:pPr lvl="4"/>
+            <a:r>
+              <a:rPr lang="en-US" smtClean="0"/>
+              <a:t>Fifth level</a:t>
+            </a:r>
+            <a:endParaRPr lang="en-US"/>
+          </a:p>
+        </p:txBody>
+      </p:sp>
+      <p:sp>
+        <p:nvSpPr>
+          <p:cNvPr id="6" name="Footer Placeholder 5"/>
+          <p:cNvSpPr>
+            <a:spLocks noGrp="1"/>
+          </p:cNvSpPr>
+          <p:nvPr>
+            <p:ph type="ftr" sz="quarter" idx="4"/>
+          </p:nvPr>
+        </p:nvSpPr>
+        <p:spPr>
+          <a:xfrm>
+            <a:off x="0" y="8685213"/>
+            <a:ext cx="2971800" cy="457200"/>
+          </a:xfrm>
+          <a:prstGeom prst="rect">
+            <a:avLst/>
+          </a:prstGeom>
+        </p:spPr>
+        <p:txBody>
+          <a:bodyPr vert="horz" lIns="91440" tIns="45720" rIns="91440" bIns="45720" rtlCol="0" anchor="b"/>
+          <a:lstStyle>
+            <a:lvl1pPr algn="l">
+              <a:defRPr sz="1200"/>
+            </a:lvl1pPr>
+          </a:lstStyle>
+          <a:p>
+            <a:endParaRPr lang="en-US"/>
+          </a:p>
+        </p:txBody>
+      </p:sp>
+      <p:sp>
+        <p:nvSpPr>
+          <p:cNvPr id="7" name="Slide Number Placeholder 6"/>
+          <p:cNvSpPr>
+            <a:spLocks noGrp="1"/>
+          </p:cNvSpPr>
+          <p:nvPr>
+            <p:ph type="sldNum" sz="quarter" idx="5"/>
+          </p:nvPr>
+        </p:nvSpPr>
+        <p:spPr>
+          <a:xfrm>
+            <a:off x="3884613" y="8685213"/>
+            <a:ext cx="2971800" cy="457200"/>
+          </a:xfrm>
+          <a:prstGeom prst="rect">
+            <a:avLst/>
+          </a:prstGeom>
+        </p:spPr>
+        <p:txBody>
+          <a:bodyPr vert="horz" lIns="91440" tIns="45720" rIns="91440" bIns="45720" rtlCol="0" anchor="b"/>
+          <a:lstStyle>
+            <a:lvl1pPr algn="r">
+              <a:defRPr sz="1200"/>
+            </a:lvl1pPr>
+          </a:lstStyle>
+          <a:p>
+            <a:fld id="{091E6D61-359C-40A8-853F-F7E106A5369F}" type="slidenum">
+              <a:rPr lang="en-US" smtClean="0"/>
+              <a:t>‹#›</a:t>
+            </a:fld>
+            <a:endParaRPr lang="en-US"/>
+          </a:p>
+        </p:txBody>
+      </p:sp>
+    </p:spTree>
+    <p:extLst>
+      <p:ext uri="{BB962C8B-B14F-4D97-AF65-F5344CB8AC3E}">
+        <p14:creationId xmlns:p14="http://schemas.microsoft.com/office/powerpoint/2010/main" val="2035412453"/>
+      </p:ext>
+    </p:extLst>
+  </p:cSld>
+  <p:clrMap bg1="lt1" tx1="dk1" bg2="lt2" tx2="dk2" accent1="accent1" accent2="accent2" accent3="accent3" accent4="accent4" accent5="accent5" accent6="accent6" hlink="hlink" folHlink="folHlink"/>
+  <p:notesStyle>
+    <a:lvl1pPr marL="0" algn="l" defTabSz="914400" rtl="0" eaLnBrk="1" latinLnBrk="0" hangingPunct="1">
+      <a:defRPr sz="1200" kern="1200">
+        <a:solidFill>
+          <a:schemeClr val="tx1"/>
+        </a:solidFill>
+        <a:latin typeface="+mn-lt"/>
+        <a:ea typeface="+mn-ea"/>
+        <a:cs typeface="+mn-cs"/>
+      </a:defRPr>
+    </a:lvl1pPr>
+    <a:lvl2pPr marL="457200" algn="l" defTabSz="914400" rtl="0" eaLnBrk="1" latinLnBrk="0" hangingPunct="1">
+      <a:defRPr sz="1200" kern="1200">
+        <a:solidFill>
+          <a:schemeClr val="tx1"/>
+        </a:solidFill>
+        <a:latin typeface="+mn-lt"/>
+        <a:ea typeface="+mn-ea"/>
+        <a:cs typeface="+mn-cs"/>
+      </a:defRPr>
+    </a:lvl2pPr>
+    <a:lvl3pPr marL="914400" algn="l" defTabSz="914400" rtl="0" eaLnBrk="1" latinLnBrk="0" hangingPunct="1">
+      <a:defRPr sz="1200" kern="1200">
+        <a:solidFill>
+          <a:schemeClr val="tx1"/>
+        </a:solidFill>
+        <a:latin typeface="+mn-lt"/>
+        <a:ea typeface="+mn-ea"/>
+        <a:cs typeface="+mn-cs"/>
+      </a:defRPr>
+    </a:lvl3pPr>
+    <a:lvl4pPr marL="1371600" algn="l" defTabSz="914400" rtl="0" eaLnBrk="1" latinLnBrk="0" hangingPunct="1">
+      <a:defRPr sz="1200" kern="1200">
+        <a:solidFill>
+          <a:schemeClr val="tx1"/>
+        </a:solidFill>
+        <a:latin typeface="+mn-lt"/>
+        <a:ea typeface="+mn-ea"/>
+        <a:cs typeface="+mn-cs"/>
+      </a:defRPr>
+    </a:lvl4pPr>
+    <a:lvl5pPr marL="1828800" algn="l" defTabSz="914400" rtl="0" eaLnBrk="1" latinLnBrk="0" hangingPunct="1">
+      <a:defRPr sz="1200" kern="1200">
+        <a:solidFill>
+          <a:schemeClr val="tx1"/>
+        </a:solidFill>
+        <a:latin typeface="+mn-lt"/>
+        <a:ea typeface="+mn-ea"/>
+        <a:cs typeface="+mn-cs"/>
+      </a:defRPr>
+    </a:lvl5pPr>
+    <a:lvl6pPr marL="2286000" algn="l" defTabSz="914400" rtl="0" eaLnBrk="1" latinLnBrk="0" hangingPunct="1">
+      <a:defRPr sz="1200" kern="1200">
+        <a:solidFill>
+          <a:schemeClr val="tx1"/>
+        </a:solidFill>
+        <a:latin typeface="+mn-lt"/>
+        <a:ea typeface="+mn-ea"/>
+        <a:cs typeface="+mn-cs"/>
+      </a:defRPr>
+    </a:lvl6pPr>
+    <a:lvl7pPr marL="2743200" algn="l" defTabSz="914400" rtl="0" eaLnBrk="1" latinLnBrk="0" hangingPunct="1">
+      <a:defRPr sz="1200" kern="1200">
+        <a:solidFill>
+          <a:schemeClr val="tx1"/>
+        </a:solidFill>
+        <a:latin typeface="+mn-lt"/>
+        <a:ea typeface="+mn-ea"/>
+        <a:cs typeface="+mn-cs"/>
+      </a:defRPr>
+    </a:lvl7pPr>
+    <a:lvl8pPr marL="3200400" algn="l" defTabSz="914400" rtl="0" eaLnBrk="1" latinLnBrk="0" hangingPunct="1">
+      <a:defRPr sz="1200" kern="1200">
+        <a:solidFill>
+          <a:schemeClr val="tx1"/>
+        </a:solidFill>
+        <a:latin typeface="+mn-lt"/>
+        <a:ea typeface="+mn-ea"/>
+        <a:cs typeface="+mn-cs"/>
+      </a:defRPr>
+    </a:lvl8pPr>
+    <a:lvl9pPr marL="3657600" algn="l" defTabSz="914400" rtl="0" eaLnBrk="1" latinLnBrk="0" hangingPunct="1">
+      <a:defRPr sz="1200" kern="1200">
+        <a:solidFill>
+          <a:schemeClr val="tx1"/>
+        </a:solidFill>
+        <a:latin typeface="+mn-lt"/>
+        <a:ea typeface="+mn-ea"/>
+        <a:cs typeface="+mn-cs"/>
+      </a:defRPr>
+    </a:lvl9pPr>
+  </p:notesStyle>
+</p:notesMaster>
+</file>
+
+<file path=ppt/notesSlides/notesSlide1.xml><?xml version="1.0" encoding="utf-8"?>
+<p:notes xmlns:a="http://schemas.openxmlformats.org/drawingml/2006/main" xmlns:r="http://schemas.openxmlformats.org/officeDocument/2006/relationships" xmlns:p="http://schemas.openxmlformats.org/presentationml/2006/main">
+  <p:cSld>
+    <p:spTree>
+      <p:nvGrpSpPr>
+        <p:cNvPr id="1" name=""/>
+        <p:cNvGrpSpPr/>
+        <p:nvPr/>
+      </p:nvGrpSpPr>
+      <p:grpSpPr>
+        <a:xfrm>
+          <a:off x="0" y="0"/>
+          <a:ext cx="0" cy="0"/>
+          <a:chOff x="0" y="0"/>
+          <a:chExt cx="0" cy="0"/>
+        </a:xfrm>
+      </p:grpSpPr>
+      <p:sp>
+        <p:nvSpPr>
+          <p:cNvPr id="2" name="Slide Image Placeholder 1"/>
+          <p:cNvSpPr>
+            <a:spLocks noGrp="1" noRot="1" noChangeAspect="1"/>
+          </p:cNvSpPr>
+          <p:nvPr>
+            <p:ph type="sldImg"/>
+          </p:nvPr>
+        </p:nvSpPr>
+        <p:spPr/>
+      </p:sp>
+      <p:sp>
+        <p:nvSpPr>
+          <p:cNvPr id="3" name="Notes Placeholder 2"/>
+          <p:cNvSpPr>
+            <a:spLocks noGrp="1"/>
+          </p:cNvSpPr>
+          <p:nvPr>
+            <p:ph type="body" idx="1"/>
+          </p:nvPr>
+        </p:nvSpPr>
+        <p:spPr/>
+        <p:txBody>
+          <a:bodyPr/>
+          <a:lstStyle/>
+          <a:p>
+            <a:pPr marL="228600" indent="-228600">
+              <a:buAutoNum type="arabicPeriod"/>
+            </a:pPr>
+            <a:r>
+              <a:rPr lang="en-US" dirty="0" smtClean="0"/>
+              <a:t>Overview, list of projects</a:t>
+            </a:r>
+          </a:p>
+          <a:p>
+            <a:pPr marL="685800" lvl="1" indent="-228600">
+              <a:buAutoNum type="arabicPeriod"/>
+            </a:pPr>
+            <a:r>
+              <a:rPr lang="en-US" dirty="0" smtClean="0"/>
+              <a:t>Public</a:t>
+            </a:r>
+            <a:r>
+              <a:rPr lang="en-US" baseline="0" dirty="0" smtClean="0"/>
+              <a:t> v Private</a:t>
+            </a:r>
+          </a:p>
+          <a:p>
+            <a:pPr marL="228600" lvl="0" indent="-228600">
+              <a:buAutoNum type="arabicPeriod"/>
+            </a:pPr>
+            <a:r>
+              <a:rPr lang="en-US" baseline="0" dirty="0" smtClean="0"/>
+              <a:t>Show LCE Project’s files – introduce README documentation</a:t>
+            </a:r>
+          </a:p>
+          <a:p>
+            <a:pPr marL="228600" lvl="0" indent="-228600">
+              <a:buAutoNum type="arabicPeriod"/>
+            </a:pPr>
+            <a:r>
+              <a:rPr lang="en-US" baseline="0" dirty="0" smtClean="0"/>
+              <a:t>Show commits</a:t>
+            </a:r>
+          </a:p>
+          <a:p>
+            <a:pPr marL="457200" lvl="1" indent="0">
+              <a:buNone/>
+            </a:pPr>
+            <a:r>
+              <a:rPr lang="en-US" baseline="0" dirty="0" smtClean="0"/>
+              <a:t>Show diff of a commit</a:t>
+            </a:r>
+          </a:p>
+          <a:p>
+            <a:pPr marL="457200" lvl="1" indent="0">
+              <a:buNone/>
+            </a:pPr>
+            <a:r>
+              <a:rPr lang="en-US" baseline="0" dirty="0" smtClean="0"/>
+              <a:t>Show comments/discussion on commit</a:t>
+            </a:r>
+          </a:p>
+          <a:p>
+            <a:pPr marL="228600" lvl="0" indent="-228600">
+              <a:buAutoNum type="arabicPeriod"/>
+            </a:pPr>
+            <a:r>
+              <a:rPr lang="en-US" baseline="0" dirty="0" smtClean="0"/>
+              <a:t>Show tags</a:t>
+            </a:r>
+          </a:p>
+          <a:p>
+            <a:pPr marL="228600" lvl="0" indent="-228600">
+              <a:buAutoNum type="arabicPeriod"/>
+            </a:pPr>
+            <a:r>
+              <a:rPr lang="en-US" baseline="0" dirty="0" smtClean="0"/>
+              <a:t>Show graphs</a:t>
+            </a:r>
+          </a:p>
+          <a:p>
+            <a:pPr marL="228600" lvl="0" indent="-228600">
+              <a:buAutoNum type="arabicPeriod"/>
+            </a:pPr>
+            <a:r>
+              <a:rPr lang="en-US" baseline="0" dirty="0" smtClean="0"/>
+              <a:t>Show wiki – </a:t>
+            </a:r>
+            <a:r>
+              <a:rPr lang="en-US" baseline="0" dirty="0" err="1" smtClean="0"/>
+              <a:t>devtools</a:t>
+            </a:r>
+            <a:r>
+              <a:rPr lang="en-US" baseline="0" dirty="0" smtClean="0"/>
+              <a:t> - https://github.com/hadley/devtools/</a:t>
+            </a:r>
+          </a:p>
+          <a:p>
+            <a:pPr marL="228600" marR="0" lvl="0" indent="-228600" algn="l" defTabSz="914400" rtl="0" eaLnBrk="1" fontAlgn="auto" latinLnBrk="0" hangingPunct="1">
+              <a:lnSpc>
+                <a:spcPct val="100000"/>
+              </a:lnSpc>
+              <a:spcBef>
+                <a:spcPts val="0"/>
+              </a:spcBef>
+              <a:spcAft>
+                <a:spcPts val="0"/>
+              </a:spcAft>
+              <a:buClrTx/>
+              <a:buSzTx/>
+              <a:buFontTx/>
+              <a:buAutoNum type="arabicPeriod"/>
+              <a:tabLst/>
+              <a:defRPr/>
+            </a:pPr>
+            <a:r>
+              <a:rPr lang="en-US" baseline="0" dirty="0" smtClean="0"/>
+              <a:t>Show issues</a:t>
+            </a:r>
+          </a:p>
+          <a:p>
+            <a:pPr marL="228600" lvl="0" indent="-228600">
+              <a:buAutoNum type="arabicPeriod"/>
+            </a:pPr>
+            <a:r>
+              <a:rPr lang="en-US" baseline="0" dirty="0" smtClean="0"/>
+              <a:t>Show pull requests</a:t>
+            </a:r>
+          </a:p>
+          <a:p>
+            <a:pPr marL="228600" lvl="0" indent="-228600">
+              <a:buAutoNum type="arabicPeriod"/>
+            </a:pPr>
+            <a:endParaRPr lang="en-US" baseline="0" dirty="0" smtClean="0"/>
+          </a:p>
+          <a:p>
+            <a:pPr marL="228600" lvl="0" indent="-228600">
+              <a:buAutoNum type="arabicPeriod"/>
+            </a:pPr>
+            <a:endParaRPr lang="en-US" dirty="0"/>
+          </a:p>
+        </p:txBody>
+      </p:sp>
+      <p:sp>
+        <p:nvSpPr>
+          <p:cNvPr id="4" name="Slide Number Placeholder 3"/>
+          <p:cNvSpPr>
+            <a:spLocks noGrp="1"/>
+          </p:cNvSpPr>
+          <p:nvPr>
+            <p:ph type="sldNum" sz="quarter" idx="10"/>
+          </p:nvPr>
+        </p:nvSpPr>
+        <p:spPr/>
+        <p:txBody>
+          <a:bodyPr/>
+          <a:lstStyle/>
+          <a:p>
+            <a:fld id="{091E6D61-359C-40A8-853F-F7E106A5369F}" type="slidenum">
+              <a:rPr lang="en-US" smtClean="0"/>
+              <a:t>10</a:t>
+            </a:fld>
+            <a:endParaRPr lang="en-US"/>
+          </a:p>
+        </p:txBody>
+      </p:sp>
+    </p:spTree>
+    <p:extLst>
+      <p:ext uri="{BB962C8B-B14F-4D97-AF65-F5344CB8AC3E}">
+        <p14:creationId xmlns:p14="http://schemas.microsoft.com/office/powerpoint/2010/main" val="527853460"/>
+      </p:ext>
+    </p:extLst>
+  </p:cSld>
+  <p:clrMapOvr>
+    <a:masterClrMapping/>
+  </p:clrMapOvr>
+</p:notes>
 </file>
 
 <file path=ppt/slideLayouts/slideLayout1.xml><?xml version="1.0" encoding="utf-8"?>
@@ -3874,6 +4445,52 @@
               <a:t>Mac and Windows versions.</a:t>
             </a:r>
           </a:p>
+          <a:p>
+            <a:r>
+              <a:rPr lang="en-US" dirty="0" smtClean="0"/>
+              <a:t>On campus: Need to open </a:t>
+            </a:r>
+            <a:r>
+              <a:rPr lang="en-US" dirty="0" err="1" smtClean="0"/>
+              <a:t>Git</a:t>
+            </a:r>
+            <a:r>
+              <a:rPr lang="en-US" dirty="0" smtClean="0"/>
+              <a:t> Shell and run:</a:t>
+            </a:r>
+          </a:p>
+          <a:p>
+            <a:pPr marL="457200" lvl="1" indent="0">
+              <a:buNone/>
+            </a:pPr>
+            <a:r>
+              <a:rPr lang="fr-FR" sz="1600" dirty="0">
+                <a:latin typeface="Lucida Console" pitchFamily="49" charset="0"/>
+              </a:rPr>
+              <a:t>git config --global </a:t>
+            </a:r>
+            <a:r>
+              <a:rPr lang="fr-FR" sz="1600" dirty="0" err="1">
+                <a:latin typeface="Lucida Console" pitchFamily="49" charset="0"/>
+              </a:rPr>
+              <a:t>http.proxy</a:t>
+            </a:r>
+            <a:r>
+              <a:rPr lang="fr-FR" sz="1600" dirty="0">
+                <a:latin typeface="Lucida Console" pitchFamily="49" charset="0"/>
+              </a:rPr>
+              <a:t> http://</a:t>
+            </a:r>
+            <a:r>
+              <a:rPr lang="fr-FR" sz="1600" dirty="0" smtClean="0">
+                <a:latin typeface="Lucida Console" pitchFamily="49" charset="0"/>
+              </a:rPr>
+              <a:t>proxy.swmed.edu:3128</a:t>
+            </a:r>
+            <a:endParaRPr lang="en-US" sz="1600" dirty="0" smtClean="0">
+              <a:latin typeface="Lucida Console" pitchFamily="49" charset="0"/>
+            </a:endParaRPr>
+          </a:p>
         </p:txBody>
       </p:sp>
       <p:sp>
@@ -4019,7 +4636,7 @@
           <a:lstStyle/>
           <a:p>
             <a:r>
-              <a:rPr lang="en-US" smtClean="0"/>
+              <a:rPr lang="en-US" dirty="0" smtClean="0"/>
               <a:t>QBRC Proposal</a:t>
             </a:r>
             <a:endParaRPr lang="en-US" dirty="0"/>
@@ -5954,4 +6571,289 @@
     </a:extraClrScheme>
   </a:extraClrSchemeLst>
 </a:theme>
+</file>
+
+<file path=ppt/theme/theme2.xml><?xml version="1.0" encoding="utf-8"?>
+<a:theme xmlns:a="http://schemas.openxmlformats.org/drawingml/2006/main" name="Office Theme">
+  <a:themeElements>
+    <a:clrScheme name="Office">
+      <a:dk1>
+        <a:sysClr val="windowText" lastClr="000000"/>
+      </a:dk1>
+      <a:lt1>
+        <a:sysClr val="window" lastClr="FFFFFF"/>
+      </a:lt1>
+      <a:dk2>
+        <a:srgbClr val="1F497D"/>
+      </a:dk2>
+      <a:lt2>
+        <a:srgbClr val="EEECE1"/>
+      </a:lt2>
+      <a:accent1>
+        <a:srgbClr val="4F81BD"/>
+      </a:accent1>
+      <a:accent2>
+        <a:srgbClr val="C0504D"/>
+      </a:accent2>
+      <a:accent3>
+        <a:srgbClr val="9BBB59"/>
+      </a:accent3>
+      <a:accent4>
+        <a:srgbClr val="8064A2"/>
+      </a:accent4>
+      <a:accent5>
+        <a:srgbClr val="4BACC6"/>
+      </a:accent5>
+      <a:accent6>
+        <a:srgbClr val="F79646"/>
+      </a:accent6>
+      <a:hlink>
+        <a:srgbClr val="0000FF"/>
+      </a:hlink>
+      <a:folHlink>
+        <a:srgbClr val="800080"/>
+      </a:folHlink>
+    </a:clrScheme>
+    <a:fontScheme name="Office">
+      <a:majorFont>
+        <a:latin typeface="Calibri"/>
+        <a:ea typeface=""/>
+        <a:cs typeface=""/>
+        <a:font script="Jpan" typeface="ＭＳ Ｐゴシック"/>
+        <a:font script="Hang" typeface="맑은 고딕"/>
+        <a:font script="Hans" typeface="宋体"/>
+        <a:font script="Hant" typeface="新細明體"/>
+        <a:font script="Arab" typeface="Times New Roman"/>
+        <a:font script="Hebr" typeface="Times New Roman"/>
+        <a:font script="Thai" typeface="Angsana New"/>
+        <a:font script="Ethi" typeface="Nyala"/>
+        <a:font script="Beng" typeface="Vrinda"/>
+        <a:font script="Gujr" typeface="Shruti"/>
+        <a:font script="Khmr" typeface="MoolBoran"/>
+        <a:font script="Knda" typeface="Tunga"/>
+        <a:font script="Guru" typeface="Raavi"/>
+        <a:font script="Cans" typeface="Euphemia"/>
+        <a:font script="Cher" typeface="Plantagenet Cherokee"/>
+        <a:font script="Yiii" typeface="Microsoft Yi Baiti"/>
+        <a:font script="Tibt" typeface="Microsoft Himalaya"/>
+        <a:font script="Thaa" typeface="MV Boli"/>
+        <a:font script="Deva" typeface="Mangal"/>
+        <a:font script="Telu" typeface="Gautami"/>
+        <a:font script="Taml" typeface="Latha"/>
+        <a:font script="Syrc" typeface="Estrangelo Edessa"/>
+        <a:font script="Orya" typeface="Kalinga"/>
+        <a:font script="Mlym" typeface="Kartika"/>
+        <a:font script="Laoo" typeface="DokChampa"/>
+        <a:font script="Sinh" typeface="Iskoola Pota"/>
+        <a:font script="Mong" typeface="Mongolian Baiti"/>
+        <a:font script="Viet" typeface="Times New Roman"/>
+        <a:font script="Uigh" typeface="Microsoft Uighur"/>
+        <a:font script="Geor" typeface="Sylfaen"/>
+      </a:majorFont>
+      <a:minorFont>
+        <a:latin typeface="Calibri"/>
+        <a:ea typeface=""/>
+        <a:cs typeface=""/>
+        <a:font script="Jpan" typeface="ＭＳ Ｐゴシック"/>
+        <a:font script="Hang" typeface="맑은 고딕"/>
+        <a:font script="Hans" typeface="宋体"/>
+        <a:font script="Hant" typeface="新細明體"/>
+        <a:font script="Arab" typeface="Arial"/>
+        <a:font script="Hebr" typeface="Arial"/>
+        <a:font script="Thai" typeface="Cordia New"/>
+        <a:font script="Ethi" typeface="Nyala"/>
+        <a:font script="Beng" typeface="Vrinda"/>
+        <a:font script="Gujr" typeface="Shruti"/>
+        <a:font script="Khmr" typeface="DaunPenh"/>
+        <a:font script="Knda" typeface="Tunga"/>
+        <a:font script="Guru" typeface="Raavi"/>
+        <a:font script="Cans" typeface="Euphemia"/>
+        <a:font script="Cher" typeface="Plantagenet Cherokee"/>
+        <a:font script="Yiii" typeface="Microsoft Yi Baiti"/>
+        <a:font script="Tibt" typeface="Microsoft Himalaya"/>
+        <a:font script="Thaa" typeface="MV Boli"/>
+        <a:font script="Deva" typeface="Mangal"/>
+        <a:font script="Telu" typeface="Gautami"/>
+        <a:font script="Taml" typeface="Latha"/>
+        <a:font script="Syrc" typeface="Estrangelo Edessa"/>
+        <a:font script="Orya" typeface="Kalinga"/>
+        <a:font script="Mlym" typeface="Kartika"/>
+        <a:font script="Laoo" typeface="DokChampa"/>
+        <a:font script="Sinh" typeface="Iskoola Pota"/>
+        <a:font script="Mong" typeface="Mongolian Baiti"/>
+        <a:font script="Viet" typeface="Arial"/>
+        <a:font script="Uigh" typeface="Microsoft Uighur"/>
+        <a:font script="Geor" typeface="Sylfaen"/>
+      </a:minorFont>
+    </a:fontScheme>
+    <a:fmtScheme name="Office">
+      <a:fillStyleLst>
+        <a:solidFill>
+          <a:schemeClr val="phClr"/>
+        </a:solidFill>
+        <a:gradFill rotWithShape="1">
+          <a:gsLst>
+            <a:gs pos="0">
+              <a:schemeClr val="phClr">
+                <a:tint val="50000"/>
+                <a:satMod val="300000"/>
+              </a:schemeClr>
+            </a:gs>
+            <a:gs pos="35000">
+              <a:schemeClr val="phClr">
+                <a:tint val="37000"/>
+                <a:satMod val="300000"/>
+              </a:schemeClr>
+            </a:gs>
+            <a:gs pos="100000">
+              <a:schemeClr val="phClr">
+                <a:tint val="15000"/>
+                <a:satMod val="350000"/>
+              </a:schemeClr>
+            </a:gs>
+          </a:gsLst>
+          <a:lin ang="16200000" scaled="1"/>
+        </a:gradFill>
+        <a:gradFill rotWithShape="1">
+          <a:gsLst>
+            <a:gs pos="0">
+              <a:schemeClr val="phClr">
+                <a:shade val="51000"/>
+                <a:satMod val="130000"/>
+              </a:schemeClr>
+            </a:gs>
+            <a:gs pos="80000">
+              <a:schemeClr val="phClr">
+                <a:shade val="93000"/>
+                <a:satMod val="130000"/>
+              </a:schemeClr>
+            </a:gs>
+            <a:gs pos="100000">
+              <a:schemeClr val="phClr">
+                <a:shade val="94000"/>
+                <a:satMod val="135000"/>
+              </a:schemeClr>
+            </a:gs>
+          </a:gsLst>
+          <a:lin ang="16200000" scaled="0"/>
+        </a:gradFill>
+      </a:fillStyleLst>
+      <a:lnStyleLst>
+        <a:ln w="9525" cap="flat" cmpd="sng" algn="ctr">
+          <a:solidFill>
+            <a:schemeClr val="phClr">
+              <a:shade val="95000"/>
+              <a:satMod val="105000"/>
+            </a:schemeClr>
+          </a:solidFill>
+          <a:prstDash val="solid"/>
+        </a:ln>
+        <a:ln w="25400" cap="flat" cmpd="sng" algn="ctr">
+          <a:solidFill>
+            <a:schemeClr val="phClr"/>
+          </a:solidFill>
+          <a:prstDash val="solid"/>
+        </a:ln>
+        <a:ln w="38100" cap="flat" cmpd="sng" algn="ctr">
+          <a:solidFill>
+            <a:schemeClr val="phClr"/>
+          </a:solidFill>
+          <a:prstDash val="solid"/>
+        </a:ln>
+      </a:lnStyleLst>
+      <a:effectStyleLst>
+        <a:effectStyle>
+          <a:effectLst>
+            <a:outerShdw blurRad="40000" dist="20000" dir="5400000" rotWithShape="0">
+              <a:srgbClr val="000000">
+                <a:alpha val="38000"/>
+              </a:srgbClr>
+            </a:outerShdw>
+          </a:effectLst>
+        </a:effectStyle>
+        <a:effectStyle>
+          <a:effectLst>
+            <a:outerShdw blurRad="40000" dist="23000" dir="5400000" rotWithShape="0">
+              <a:srgbClr val="000000">
+                <a:alpha val="35000"/>
+              </a:srgbClr>
+            </a:outerShdw>
+          </a:effectLst>
+        </a:effectStyle>
+        <a:effectStyle>
+          <a:effectLst>
+            <a:outerShdw blurRad="40000" dist="23000" dir="5400000" rotWithShape="0">
+              <a:srgbClr val="000000">
+                <a:alpha val="35000"/>
+              </a:srgbClr>
+            </a:outerShdw>
+          </a:effectLst>
+          <a:scene3d>
+            <a:camera prst="orthographicFront">
+              <a:rot lat="0" lon="0" rev="0"/>
+            </a:camera>
+            <a:lightRig rig="threePt" dir="t">
+              <a:rot lat="0" lon="0" rev="1200000"/>
+            </a:lightRig>
+          </a:scene3d>
+          <a:sp3d>
+            <a:bevelT w="63500" h="25400"/>
+          </a:sp3d>
+        </a:effectStyle>
+      </a:effectStyleLst>
+      <a:bgFillStyleLst>
+        <a:solidFill>
+          <a:schemeClr val="phClr"/>
+        </a:solidFill>
+        <a:gradFill rotWithShape="1">
+          <a:gsLst>
+            <a:gs pos="0">
+              <a:schemeClr val="phClr">
+                <a:tint val="40000"/>
+                <a:satMod val="350000"/>
+              </a:schemeClr>
+            </a:gs>
+            <a:gs pos="40000">
+              <a:schemeClr val="phClr">
+                <a:tint val="45000"/>
+                <a:shade val="99000"/>
+                <a:satMod val="350000"/>
+              </a:schemeClr>
+            </a:gs>
+            <a:gs pos="100000">
+              <a:schemeClr val="phClr">
+                <a:shade val="20000"/>
+                <a:satMod val="255000"/>
+              </a:schemeClr>
+            </a:gs>
+          </a:gsLst>
+          <a:path path="circle">
+            <a:fillToRect l="50000" t="-80000" r="50000" b="180000"/>
+          </a:path>
+        </a:gradFill>
+        <a:gradFill rotWithShape="1">
+          <a:gsLst>
+            <a:gs pos="0">
+              <a:schemeClr val="phClr">
+                <a:tint val="80000"/>
+                <a:satMod val="300000"/>
+              </a:schemeClr>
+            </a:gs>
+            <a:gs pos="100000">
+              <a:schemeClr val="phClr">
+                <a:shade val="30000"/>
+                <a:satMod val="200000"/>
+              </a:schemeClr>
+            </a:gs>
+          </a:gsLst>
+          <a:path path="circle">
+            <a:fillToRect l="50000" t="50000" r="50000" b="50000"/>
+          </a:path>
+        </a:gradFill>
+      </a:bgFillStyleLst>
+    </a:fmtScheme>
+  </a:themeElements>
+  <a:objectDefaults/>
+  <a:extraClrSchemeLst/>
+</a:theme>
 </file>
</xml_diff>

<commit_message>
Added GitHub Client UI screenshot.
</commit_message>
<xml_diff>
--- a/Git & Github.pptx
+++ b/Git & Github.pptx
@@ -5,7 +5,7 @@
     <p:sldMasterId id="2147483660" r:id="rId1"/>
   </p:sldMasterIdLst>
   <p:notesMasterIdLst>
-    <p:notesMasterId r:id="rId16"/>
+    <p:notesMasterId r:id="rId17"/>
   </p:notesMasterIdLst>
   <p:sldIdLst>
     <p:sldId id="256" r:id="rId2"/>
@@ -20,8 +20,9 @@
     <p:sldId id="267" r:id="rId11"/>
     <p:sldId id="269" r:id="rId12"/>
     <p:sldId id="270" r:id="rId13"/>
-    <p:sldId id="271" r:id="rId14"/>
-    <p:sldId id="272" r:id="rId15"/>
+    <p:sldId id="273" r:id="rId14"/>
+    <p:sldId id="271" r:id="rId15"/>
+    <p:sldId id="272" r:id="rId16"/>
   </p:sldIdLst>
   <p:sldSz cx="9144000" cy="6858000" type="screen4x3"/>
   <p:notesSz cx="6858000" cy="9144000"/>
@@ -4412,7 +4413,7 @@
             <a:spLocks noGrp="1"/>
           </p:cNvSpPr>
           <p:nvPr>
-            <p:ph sz="half" idx="1"/>
+            <p:ph idx="1"/>
           </p:nvPr>
         </p:nvSpPr>
         <p:spPr/>
@@ -4490,25 +4491,6 @@
             <a:endParaRPr lang="en-US" sz="1600" dirty="0" smtClean="0">
               <a:latin typeface="Lucida Console" pitchFamily="49" charset="0"/>
             </a:endParaRPr>
-          </a:p>
-        </p:txBody>
-      </p:sp>
-      <p:sp>
-        <p:nvSpPr>
-          <p:cNvPr id="5" name="Content Placeholder 4"/>
-          <p:cNvSpPr>
-            <a:spLocks noGrp="1"/>
-          </p:cNvSpPr>
-          <p:nvPr>
-            <p:ph sz="half" idx="2"/>
-          </p:nvPr>
-        </p:nvSpPr>
-        <p:spPr/>
-        <p:txBody>
-          <a:bodyPr/>
-          <a:lstStyle/>
-          <a:p>
-            <a:endParaRPr lang="en-US"/>
           </a:p>
         </p:txBody>
       </p:sp>
@@ -4562,6 +4544,149 @@
           <a:p>
             <a:r>
               <a:rPr lang="en-US" dirty="0" err="1" smtClean="0"/>
+              <a:t>GitHub</a:t>
+            </a:r>
+            <a:r>
+              <a:rPr lang="en-US" dirty="0" smtClean="0"/>
+              <a:t> Client</a:t>
+            </a:r>
+            <a:endParaRPr lang="en-US" dirty="0"/>
+          </a:p>
+        </p:txBody>
+      </p:sp>
+      <p:sp>
+        <p:nvSpPr>
+          <p:cNvPr id="3" name="Content Placeholder 2"/>
+          <p:cNvSpPr>
+            <a:spLocks noGrp="1"/>
+          </p:cNvSpPr>
+          <p:nvPr>
+            <p:ph idx="1"/>
+          </p:nvPr>
+        </p:nvSpPr>
+        <p:spPr/>
+        <p:txBody>
+          <a:bodyPr/>
+          <a:lstStyle/>
+          <a:p>
+            <a:endParaRPr lang="en-US" dirty="0"/>
+          </a:p>
+        </p:txBody>
+      </p:sp>
+      <p:pic>
+        <p:nvPicPr>
+          <p:cNvPr id="1027" name="Picture 3"/>
+          <p:cNvPicPr>
+            <a:picLocks noChangeAspect="1" noChangeArrowheads="1"/>
+          </p:cNvPicPr>
+          <p:nvPr/>
+        </p:nvPicPr>
+        <p:blipFill>
+          <a:blip r:embed="rId2">
+            <a:extLst>
+              <a:ext uri="{28A0092B-C50C-407E-A947-70E740481C1C}">
+                <a14:useLocalDpi xmlns:a14="http://schemas.microsoft.com/office/drawing/2010/main" val="0"/>
+              </a:ext>
+            </a:extLst>
+          </a:blip>
+          <a:srcRect/>
+          <a:stretch>
+            <a:fillRect/>
+          </a:stretch>
+        </p:blipFill>
+        <p:spPr bwMode="auto">
+          <a:xfrm>
+            <a:off x="152400" y="1477682"/>
+            <a:ext cx="8967107" cy="4923118"/>
+          </a:xfrm>
+          <a:prstGeom prst="rect">
+            <a:avLst/>
+          </a:prstGeom>
+          <a:noFill/>
+          <a:ln>
+            <a:noFill/>
+          </a:ln>
+          <a:effectLst/>
+          <a:extLst>
+            <a:ext uri="{909E8E84-426E-40DD-AFC4-6F175D3DCCD1}">
+              <a14:hiddenFill xmlns:a14="http://schemas.microsoft.com/office/drawing/2010/main">
+                <a:solidFill>
+                  <a:schemeClr val="accent1"/>
+                </a:solidFill>
+              </a14:hiddenFill>
+            </a:ext>
+            <a:ext uri="{91240B29-F687-4F45-9708-019B960494DF}">
+              <a14:hiddenLine xmlns:a14="http://schemas.microsoft.com/office/drawing/2010/main" w="9525">
+                <a:solidFill>
+                  <a:schemeClr val="tx1"/>
+                </a:solidFill>
+                <a:miter lim="800000"/>
+                <a:headEnd/>
+                <a:tailEnd/>
+              </a14:hiddenLine>
+            </a:ext>
+            <a:ext uri="{AF507438-7753-43E0-B8FC-AC1667EBCBE1}">
+              <a14:hiddenEffects xmlns:a14="http://schemas.microsoft.com/office/drawing/2010/main">
+                <a:effectLst>
+                  <a:outerShdw dist="35921" dir="2700000" algn="ctr" rotWithShape="0">
+                    <a:schemeClr val="bg2"/>
+                  </a:outerShdw>
+                </a:effectLst>
+              </a14:hiddenEffects>
+            </a:ext>
+          </a:extLst>
+        </p:spPr>
+      </p:pic>
+    </p:spTree>
+    <p:extLst>
+      <p:ext uri="{BB962C8B-B14F-4D97-AF65-F5344CB8AC3E}">
+        <p14:creationId xmlns:p14="http://schemas.microsoft.com/office/powerpoint/2010/main" val="3787008527"/>
+      </p:ext>
+    </p:extLst>
+  </p:cSld>
+  <p:clrMapOvr>
+    <a:masterClrMapping/>
+  </p:clrMapOvr>
+  <p:transition spd="med">
+    <p:fade thruBlk="1"/>
+  </p:transition>
+</p:sld>
+</file>
+
+<file path=ppt/slides/slide14.xml><?xml version="1.0" encoding="utf-8"?>
+<p:sld xmlns:a="http://schemas.openxmlformats.org/drawingml/2006/main" xmlns:r="http://schemas.openxmlformats.org/officeDocument/2006/relationships" xmlns:p="http://schemas.openxmlformats.org/presentationml/2006/main">
+  <p:cSld>
+    <p:spTree>
+      <p:nvGrpSpPr>
+        <p:cNvPr id="1" name=""/>
+        <p:cNvGrpSpPr/>
+        <p:nvPr/>
+      </p:nvGrpSpPr>
+      <p:grpSpPr>
+        <a:xfrm>
+          <a:off x="0" y="0"/>
+          <a:ext cx="0" cy="0"/>
+          <a:chOff x="0" y="0"/>
+          <a:chExt cx="0" cy="0"/>
+        </a:xfrm>
+      </p:grpSpPr>
+      <p:sp>
+        <p:nvSpPr>
+          <p:cNvPr id="2" name="Title 1"/>
+          <p:cNvSpPr>
+            <a:spLocks noGrp="1"/>
+          </p:cNvSpPr>
+          <p:nvPr>
+            <p:ph type="title"/>
+          </p:nvPr>
+        </p:nvSpPr>
+        <p:spPr/>
+        <p:txBody>
+          <a:bodyPr/>
+          <a:lstStyle/>
+          <a:p>
+            <a:r>
+              <a:rPr lang="en-US" dirty="0" err="1" smtClean="0"/>
               <a:t>Rstudio</a:t>
             </a:r>
             <a:endParaRPr lang="en-US" dirty="0"/>
@@ -4603,7 +4728,7 @@
 </p:sld>
 </file>
 
-<file path=ppt/slides/slide14.xml><?xml version="1.0" encoding="utf-8"?>
+<file path=ppt/slides/slide15.xml><?xml version="1.0" encoding="utf-8"?>
 <p:sld xmlns:a="http://schemas.openxmlformats.org/drawingml/2006/main" xmlns:r="http://schemas.openxmlformats.org/officeDocument/2006/relationships" xmlns:p="http://schemas.openxmlformats.org/presentationml/2006/main">
   <p:cSld>
     <p:spTree>
@@ -5672,23 +5797,20 @@
             <a:pPr lvl="1"/>
             <a:r>
               <a:rPr lang="en-US" dirty="0" smtClean="0"/>
-              <a:t>Social platform – the “Facebook” of coding.</a:t>
-            </a:r>
-          </a:p>
-          <a:p>
-            <a:pPr lvl="2"/>
+              <a:t>Social platform – the “Facebook” of coding</a:t>
+            </a:r>
             <a:r>
               <a:rPr lang="en-US" dirty="0" smtClean="0"/>
-              <a:t>Follow other users or projects</a:t>
-            </a:r>
-          </a:p>
-          <a:p>
-            <a:pPr lvl="2"/>
-            <a:r>
-              <a:rPr lang="en-US" dirty="0" smtClean="0"/>
-              <a:t>Contribute to open-source projects</a:t>
-            </a:r>
-            <a:endParaRPr lang="en-US" dirty="0"/>
+              <a:t>.</a:t>
+            </a:r>
+          </a:p>
+          <a:p>
+            <a:pPr lvl="1"/>
+            <a:r>
+              <a:rPr lang="en-US" smtClean="0"/>
+              <a:t>Client-Side UI</a:t>
+            </a:r>
+            <a:endParaRPr lang="en-US" dirty="0" smtClean="0"/>
           </a:p>
         </p:txBody>
       </p:sp>

</xml_diff>

<commit_message>
Started adding anti-pattern slides.
</commit_message>
<xml_diff>
--- a/Git & Github.pptx
+++ b/Git & Github.pptx
@@ -5,7 +5,7 @@
     <p:sldMasterId id="2147483660" r:id="rId1"/>
   </p:sldMasterIdLst>
   <p:notesMasterIdLst>
-    <p:notesMasterId r:id="rId17"/>
+    <p:notesMasterId r:id="rId21"/>
   </p:notesMasterIdLst>
   <p:sldIdLst>
     <p:sldId id="256" r:id="rId2"/>
@@ -21,8 +21,12 @@
     <p:sldId id="269" r:id="rId12"/>
     <p:sldId id="270" r:id="rId13"/>
     <p:sldId id="273" r:id="rId14"/>
-    <p:sldId id="271" r:id="rId15"/>
-    <p:sldId id="272" r:id="rId16"/>
+    <p:sldId id="274" r:id="rId15"/>
+    <p:sldId id="271" r:id="rId16"/>
+    <p:sldId id="275" r:id="rId17"/>
+    <p:sldId id="272" r:id="rId18"/>
+    <p:sldId id="277" r:id="rId19"/>
+    <p:sldId id="276" r:id="rId20"/>
   </p:sldIdLst>
   <p:sldSz cx="9144000" cy="6858000" type="screen4x3"/>
   <p:notesSz cx="6858000" cy="9144000"/>
@@ -683,6 +687,106 @@
     <p:extLst>
       <p:ext uri="{BB962C8B-B14F-4D97-AF65-F5344CB8AC3E}">
         <p14:creationId xmlns:p14="http://schemas.microsoft.com/office/powerpoint/2010/main" val="527853460"/>
+      </p:ext>
+    </p:extLst>
+  </p:cSld>
+  <p:clrMapOvr>
+    <a:masterClrMapping/>
+  </p:clrMapOvr>
+</p:notes>
+</file>
+
+<file path=ppt/notesSlides/notesSlide2.xml><?xml version="1.0" encoding="utf-8"?>
+<p:notes xmlns:a="http://schemas.openxmlformats.org/drawingml/2006/main" xmlns:r="http://schemas.openxmlformats.org/officeDocument/2006/relationships" xmlns:p="http://schemas.openxmlformats.org/presentationml/2006/main">
+  <p:cSld>
+    <p:spTree>
+      <p:nvGrpSpPr>
+        <p:cNvPr id="1" name=""/>
+        <p:cNvGrpSpPr/>
+        <p:nvPr/>
+      </p:nvGrpSpPr>
+      <p:grpSpPr>
+        <a:xfrm>
+          <a:off x="0" y="0"/>
+          <a:ext cx="0" cy="0"/>
+          <a:chOff x="0" y="0"/>
+          <a:chExt cx="0" cy="0"/>
+        </a:xfrm>
+      </p:grpSpPr>
+      <p:sp>
+        <p:nvSpPr>
+          <p:cNvPr id="2" name="Slide Image Placeholder 1"/>
+          <p:cNvSpPr>
+            <a:spLocks noGrp="1" noRot="1" noChangeAspect="1"/>
+          </p:cNvSpPr>
+          <p:nvPr>
+            <p:ph type="sldImg"/>
+          </p:nvPr>
+        </p:nvSpPr>
+        <p:spPr/>
+      </p:sp>
+      <p:sp>
+        <p:nvSpPr>
+          <p:cNvPr id="3" name="Notes Placeholder 2"/>
+          <p:cNvSpPr>
+            <a:spLocks noGrp="1"/>
+          </p:cNvSpPr>
+          <p:nvPr>
+            <p:ph type="body" idx="1"/>
+          </p:nvPr>
+        </p:nvSpPr>
+        <p:spPr/>
+        <p:txBody>
+          <a:bodyPr/>
+          <a:lstStyle/>
+          <a:p>
+            <a:r>
+              <a:rPr lang="en-US" dirty="0" smtClean="0"/>
+              <a:t>2. Email may not always be bad (can send examples), but re-evaluate</a:t>
+            </a:r>
+            <a:r>
+              <a:rPr lang="en-US" baseline="0" dirty="0" smtClean="0"/>
+              <a:t> if you find yourself attaching multiple scripts to an email – will it be difficult for you or the recipient to find this code in 6 months? Should you setup a more permanent home for the code on </a:t>
+            </a:r>
+            <a:r>
+              <a:rPr lang="en-US" baseline="0" dirty="0" err="1" smtClean="0"/>
+              <a:t>Github</a:t>
+            </a:r>
+            <a:r>
+              <a:rPr lang="en-US" baseline="0" dirty="0" smtClean="0"/>
+              <a:t>?</a:t>
+            </a:r>
+            <a:endParaRPr lang="en-US" dirty="0"/>
+          </a:p>
+        </p:txBody>
+      </p:sp>
+      <p:sp>
+        <p:nvSpPr>
+          <p:cNvPr id="4" name="Slide Number Placeholder 3"/>
+          <p:cNvSpPr>
+            <a:spLocks noGrp="1"/>
+          </p:cNvSpPr>
+          <p:nvPr>
+            <p:ph type="sldNum" sz="quarter" idx="10"/>
+          </p:nvPr>
+        </p:nvSpPr>
+        <p:spPr/>
+        <p:txBody>
+          <a:bodyPr/>
+          <a:lstStyle/>
+          <a:p>
+            <a:fld id="{091E6D61-359C-40A8-853F-F7E106A5369F}" type="slidenum">
+              <a:rPr lang="en-US" smtClean="0"/>
+              <a:t>19</a:t>
+            </a:fld>
+            <a:endParaRPr lang="en-US"/>
+          </a:p>
+        </p:txBody>
+      </p:sp>
+    </p:spTree>
+    <p:extLst>
+      <p:ext uri="{BB962C8B-B14F-4D97-AF65-F5344CB8AC3E}">
+        <p14:creationId xmlns:p14="http://schemas.microsoft.com/office/powerpoint/2010/main" val="360083573"/>
       </p:ext>
     </p:extLst>
   </p:cSld>
@@ -4687,7 +4791,11 @@
           <a:p>
             <a:r>
               <a:rPr lang="en-US" dirty="0" err="1" smtClean="0"/>
-              <a:t>Rstudio</a:t>
+              <a:t>GitHub</a:t>
+            </a:r>
+            <a:r>
+              <a:rPr lang="en-US" dirty="0" smtClean="0"/>
+              <a:t> Client Demo</a:t>
             </a:r>
             <a:endParaRPr lang="en-US" dirty="0"/>
           </a:p>
@@ -4695,12 +4803,12 @@
       </p:sp>
       <p:sp>
         <p:nvSpPr>
-          <p:cNvPr id="5" name="Content Placeholder 4"/>
-          <p:cNvSpPr>
-            <a:spLocks noGrp="1"/>
-          </p:cNvSpPr>
-          <p:nvPr>
-            <p:ph idx="1"/>
+          <p:cNvPr id="3" name="Text Placeholder 2"/>
+          <p:cNvSpPr>
+            <a:spLocks noGrp="1"/>
+          </p:cNvSpPr>
+          <p:nvPr>
+            <p:ph type="body" idx="1"/>
           </p:nvPr>
         </p:nvSpPr>
         <p:spPr/>
@@ -4715,7 +4823,7 @@
     </p:spTree>
     <p:extLst>
       <p:ext uri="{BB962C8B-B14F-4D97-AF65-F5344CB8AC3E}">
-        <p14:creationId xmlns:p14="http://schemas.microsoft.com/office/powerpoint/2010/main" val="4254214701"/>
+        <p14:creationId xmlns:p14="http://schemas.microsoft.com/office/powerpoint/2010/main" val="3034939323"/>
       </p:ext>
     </p:extLst>
   </p:cSld>
@@ -4761,6 +4869,179 @@
           <a:lstStyle/>
           <a:p>
             <a:r>
+              <a:rPr lang="en-US" dirty="0" err="1" smtClean="0"/>
+              <a:t>Rstudio</a:t>
+            </a:r>
+            <a:endParaRPr lang="en-US" dirty="0"/>
+          </a:p>
+        </p:txBody>
+      </p:sp>
+      <p:sp>
+        <p:nvSpPr>
+          <p:cNvPr id="5" name="Content Placeholder 4"/>
+          <p:cNvSpPr>
+            <a:spLocks noGrp="1"/>
+          </p:cNvSpPr>
+          <p:nvPr>
+            <p:ph idx="1"/>
+          </p:nvPr>
+        </p:nvSpPr>
+        <p:spPr/>
+        <p:txBody>
+          <a:bodyPr/>
+          <a:lstStyle/>
+          <a:p>
+            <a:r>
+              <a:rPr lang="en-US" dirty="0" smtClean="0"/>
+              <a:t>Supports </a:t>
+            </a:r>
+            <a:r>
+              <a:rPr lang="en-US" dirty="0" err="1" smtClean="0"/>
+              <a:t>Git</a:t>
+            </a:r>
+            <a:r>
+              <a:rPr lang="en-US" dirty="0" smtClean="0"/>
+              <a:t> and SVN revision control for “Projects.”</a:t>
+            </a:r>
+          </a:p>
+          <a:p>
+            <a:pPr lvl="1"/>
+            <a:r>
+              <a:rPr lang="en-US" dirty="0" smtClean="0"/>
+              <a:t>Nice graphical interface for committing and viewing diffs.</a:t>
+            </a:r>
+            <a:endParaRPr lang="en-US" dirty="0"/>
+          </a:p>
+        </p:txBody>
+      </p:sp>
+    </p:spTree>
+    <p:extLst>
+      <p:ext uri="{BB962C8B-B14F-4D97-AF65-F5344CB8AC3E}">
+        <p14:creationId xmlns:p14="http://schemas.microsoft.com/office/powerpoint/2010/main" val="4254214701"/>
+      </p:ext>
+    </p:extLst>
+  </p:cSld>
+  <p:clrMapOvr>
+    <a:masterClrMapping/>
+  </p:clrMapOvr>
+  <p:transition spd="med">
+    <p:fade thruBlk="1"/>
+  </p:transition>
+</p:sld>
+</file>
+
+<file path=ppt/slides/slide16.xml><?xml version="1.0" encoding="utf-8"?>
+<p:sld xmlns:a="http://schemas.openxmlformats.org/drawingml/2006/main" xmlns:r="http://schemas.openxmlformats.org/officeDocument/2006/relationships" xmlns:p="http://schemas.openxmlformats.org/presentationml/2006/main">
+  <p:cSld>
+    <p:spTree>
+      <p:nvGrpSpPr>
+        <p:cNvPr id="1" name=""/>
+        <p:cNvGrpSpPr/>
+        <p:nvPr/>
+      </p:nvGrpSpPr>
+      <p:grpSpPr>
+        <a:xfrm>
+          <a:off x="0" y="0"/>
+          <a:ext cx="0" cy="0"/>
+          <a:chOff x="0" y="0"/>
+          <a:chExt cx="0" cy="0"/>
+        </a:xfrm>
+      </p:grpSpPr>
+      <p:sp>
+        <p:nvSpPr>
+          <p:cNvPr id="2" name="Title 1"/>
+          <p:cNvSpPr>
+            <a:spLocks noGrp="1"/>
+          </p:cNvSpPr>
+          <p:nvPr>
+            <p:ph type="title"/>
+          </p:nvPr>
+        </p:nvSpPr>
+        <p:spPr/>
+        <p:txBody>
+          <a:bodyPr/>
+          <a:lstStyle/>
+          <a:p>
+            <a:r>
+              <a:rPr lang="en-US" dirty="0" err="1" smtClean="0"/>
+              <a:t>Rstudio</a:t>
+            </a:r>
+            <a:r>
+              <a:rPr lang="en-US" dirty="0" smtClean="0"/>
+              <a:t> Demo</a:t>
+            </a:r>
+            <a:endParaRPr lang="en-US" dirty="0"/>
+          </a:p>
+        </p:txBody>
+      </p:sp>
+      <p:sp>
+        <p:nvSpPr>
+          <p:cNvPr id="3" name="Text Placeholder 2"/>
+          <p:cNvSpPr>
+            <a:spLocks noGrp="1"/>
+          </p:cNvSpPr>
+          <p:nvPr>
+            <p:ph type="body" idx="1"/>
+          </p:nvPr>
+        </p:nvSpPr>
+        <p:spPr/>
+        <p:txBody>
+          <a:bodyPr/>
+          <a:lstStyle/>
+          <a:p>
+            <a:endParaRPr lang="en-US"/>
+          </a:p>
+        </p:txBody>
+      </p:sp>
+    </p:spTree>
+    <p:extLst>
+      <p:ext uri="{BB962C8B-B14F-4D97-AF65-F5344CB8AC3E}">
+        <p14:creationId xmlns:p14="http://schemas.microsoft.com/office/powerpoint/2010/main" val="3635145261"/>
+      </p:ext>
+    </p:extLst>
+  </p:cSld>
+  <p:clrMapOvr>
+    <a:masterClrMapping/>
+  </p:clrMapOvr>
+  <p:transition spd="med">
+    <p:fade thruBlk="1"/>
+  </p:transition>
+</p:sld>
+</file>
+
+<file path=ppt/slides/slide17.xml><?xml version="1.0" encoding="utf-8"?>
+<p:sld xmlns:a="http://schemas.openxmlformats.org/drawingml/2006/main" xmlns:r="http://schemas.openxmlformats.org/officeDocument/2006/relationships" xmlns:p="http://schemas.openxmlformats.org/presentationml/2006/main">
+  <p:cSld>
+    <p:spTree>
+      <p:nvGrpSpPr>
+        <p:cNvPr id="1" name=""/>
+        <p:cNvGrpSpPr/>
+        <p:nvPr/>
+      </p:nvGrpSpPr>
+      <p:grpSpPr>
+        <a:xfrm>
+          <a:off x="0" y="0"/>
+          <a:ext cx="0" cy="0"/>
+          <a:chOff x="0" y="0"/>
+          <a:chExt cx="0" cy="0"/>
+        </a:xfrm>
+      </p:grpSpPr>
+      <p:sp>
+        <p:nvSpPr>
+          <p:cNvPr id="2" name="Title 1"/>
+          <p:cNvSpPr>
+            <a:spLocks noGrp="1"/>
+          </p:cNvSpPr>
+          <p:nvPr>
+            <p:ph type="title"/>
+          </p:nvPr>
+        </p:nvSpPr>
+        <p:spPr/>
+        <p:txBody>
+          <a:bodyPr/>
+          <a:lstStyle/>
+          <a:p>
+            <a:r>
               <a:rPr lang="en-US" dirty="0" smtClean="0"/>
               <a:t>QBRC Proposal</a:t>
             </a:r>
@@ -4791,6 +5072,198 @@
     <p:extLst>
       <p:ext uri="{BB962C8B-B14F-4D97-AF65-F5344CB8AC3E}">
         <p14:creationId xmlns:p14="http://schemas.microsoft.com/office/powerpoint/2010/main" val="4034468156"/>
+      </p:ext>
+    </p:extLst>
+  </p:cSld>
+  <p:clrMapOvr>
+    <a:masterClrMapping/>
+  </p:clrMapOvr>
+  <p:transition spd="med">
+    <p:fade thruBlk="1"/>
+  </p:transition>
+</p:sld>
+</file>
+
+<file path=ppt/slides/slide18.xml><?xml version="1.0" encoding="utf-8"?>
+<p:sld xmlns:a="http://schemas.openxmlformats.org/drawingml/2006/main" xmlns:r="http://schemas.openxmlformats.org/officeDocument/2006/relationships" xmlns:p="http://schemas.openxmlformats.org/presentationml/2006/main">
+  <p:cSld>
+    <p:spTree>
+      <p:nvGrpSpPr>
+        <p:cNvPr id="1" name=""/>
+        <p:cNvGrpSpPr/>
+        <p:nvPr/>
+      </p:nvGrpSpPr>
+      <p:grpSpPr>
+        <a:xfrm>
+          <a:off x="0" y="0"/>
+          <a:ext cx="0" cy="0"/>
+          <a:chOff x="0" y="0"/>
+          <a:chExt cx="0" cy="0"/>
+        </a:xfrm>
+      </p:grpSpPr>
+      <p:sp>
+        <p:nvSpPr>
+          <p:cNvPr id="2" name="Title 1"/>
+          <p:cNvSpPr>
+            <a:spLocks noGrp="1"/>
+          </p:cNvSpPr>
+          <p:nvPr>
+            <p:ph type="title"/>
+          </p:nvPr>
+        </p:nvSpPr>
+        <p:spPr/>
+        <p:txBody>
+          <a:bodyPr/>
+          <a:lstStyle/>
+          <a:p>
+            <a:r>
+              <a:rPr lang="en-US" dirty="0" smtClean="0"/>
+              <a:t>Anti-Pattern</a:t>
+            </a:r>
+            <a:endParaRPr lang="en-US" dirty="0"/>
+          </a:p>
+        </p:txBody>
+      </p:sp>
+      <p:sp>
+        <p:nvSpPr>
+          <p:cNvPr id="3" name="Text Placeholder 2"/>
+          <p:cNvSpPr>
+            <a:spLocks noGrp="1"/>
+          </p:cNvSpPr>
+          <p:nvPr>
+            <p:ph type="body" idx="1"/>
+          </p:nvPr>
+        </p:nvSpPr>
+        <p:spPr/>
+        <p:txBody>
+          <a:bodyPr/>
+          <a:lstStyle/>
+          <a:p>
+            <a:r>
+              <a:rPr lang="en-US" dirty="0" smtClean="0"/>
+              <a:t>“A pattern that may be commonly used by us ineffective and/or counterproductive in practice.”</a:t>
+            </a:r>
+            <a:endParaRPr lang="en-US" dirty="0"/>
+          </a:p>
+        </p:txBody>
+      </p:sp>
+    </p:spTree>
+    <p:extLst>
+      <p:ext uri="{BB962C8B-B14F-4D97-AF65-F5344CB8AC3E}">
+        <p14:creationId xmlns:p14="http://schemas.microsoft.com/office/powerpoint/2010/main" val="638555436"/>
+      </p:ext>
+    </p:extLst>
+  </p:cSld>
+  <p:clrMapOvr>
+    <a:masterClrMapping/>
+  </p:clrMapOvr>
+  <p:transition spd="med">
+    <p:fade thruBlk="1"/>
+  </p:transition>
+</p:sld>
+</file>
+
+<file path=ppt/slides/slide19.xml><?xml version="1.0" encoding="utf-8"?>
+<p:sld xmlns:a="http://schemas.openxmlformats.org/drawingml/2006/main" xmlns:r="http://schemas.openxmlformats.org/officeDocument/2006/relationships" xmlns:p="http://schemas.openxmlformats.org/presentationml/2006/main">
+  <p:cSld>
+    <p:spTree>
+      <p:nvGrpSpPr>
+        <p:cNvPr id="1" name=""/>
+        <p:cNvGrpSpPr/>
+        <p:nvPr/>
+      </p:nvGrpSpPr>
+      <p:grpSpPr>
+        <a:xfrm>
+          <a:off x="0" y="0"/>
+          <a:ext cx="0" cy="0"/>
+          <a:chOff x="0" y="0"/>
+          <a:chExt cx="0" cy="0"/>
+        </a:xfrm>
+      </p:grpSpPr>
+      <p:sp>
+        <p:nvSpPr>
+          <p:cNvPr id="2" name="Title 1"/>
+          <p:cNvSpPr>
+            <a:spLocks noGrp="1"/>
+          </p:cNvSpPr>
+          <p:nvPr>
+            <p:ph type="title"/>
+          </p:nvPr>
+        </p:nvSpPr>
+        <p:spPr/>
+        <p:txBody>
+          <a:bodyPr/>
+          <a:lstStyle/>
+          <a:p>
+            <a:r>
+              <a:rPr lang="en-US" dirty="0" smtClean="0"/>
+              <a:t>Revision Control Anti-Patterns</a:t>
+            </a:r>
+            <a:endParaRPr lang="en-US" dirty="0"/>
+          </a:p>
+        </p:txBody>
+      </p:sp>
+      <p:sp>
+        <p:nvSpPr>
+          <p:cNvPr id="3" name="Content Placeholder 2"/>
+          <p:cNvSpPr>
+            <a:spLocks noGrp="1"/>
+          </p:cNvSpPr>
+          <p:nvPr>
+            <p:ph idx="1"/>
+          </p:nvPr>
+        </p:nvSpPr>
+        <p:spPr/>
+        <p:txBody>
+          <a:bodyPr/>
+          <a:lstStyle/>
+          <a:p>
+            <a:pPr marL="514350" indent="-514350">
+              <a:buFont typeface="+mj-lt"/>
+              <a:buAutoNum type="arabicPeriod"/>
+            </a:pPr>
+            <a:r>
+              <a:rPr lang="en-US" dirty="0" smtClean="0"/>
+              <a:t>Adding a suffix to a file to differentiate it.</a:t>
+            </a:r>
+          </a:p>
+          <a:p>
+            <a:pPr marL="914400" lvl="1" indent="-514350"/>
+            <a:r>
+              <a:rPr lang="en-US" dirty="0" smtClean="0"/>
+              <a:t>Initials, the date, version number</a:t>
+            </a:r>
+          </a:p>
+          <a:p>
+            <a:pPr marL="514350" indent="-514350">
+              <a:buFont typeface="+mj-lt"/>
+              <a:buAutoNum type="arabicPeriod"/>
+            </a:pPr>
+            <a:r>
+              <a:rPr lang="en-US" dirty="0" smtClean="0"/>
+              <a:t>Attaching code to an email</a:t>
+            </a:r>
+          </a:p>
+          <a:p>
+            <a:pPr marL="514350" indent="-514350">
+              <a:buFont typeface="+mj-lt"/>
+              <a:buAutoNum type="arabicPeriod"/>
+            </a:pPr>
+            <a:endParaRPr lang="en-US" dirty="0" smtClean="0"/>
+          </a:p>
+          <a:p>
+            <a:pPr marL="514350" indent="-514350">
+              <a:buFont typeface="+mj-lt"/>
+              <a:buAutoNum type="arabicPeriod"/>
+            </a:pPr>
+            <a:endParaRPr lang="en-US" dirty="0"/>
+          </a:p>
+        </p:txBody>
+      </p:sp>
+    </p:spTree>
+    <p:extLst>
+      <p:ext uri="{BB962C8B-B14F-4D97-AF65-F5344CB8AC3E}">
+        <p14:creationId xmlns:p14="http://schemas.microsoft.com/office/powerpoint/2010/main" val="2649739094"/>
       </p:ext>
     </p:extLst>
   </p:cSld>
@@ -4919,7 +5392,6 @@
               <a:rPr lang="en-US" dirty="0" smtClean="0"/>
               <a:t>QBRC Proposal</a:t>
             </a:r>
-            <a:endParaRPr lang="en-US" dirty="0" smtClean="0"/>
           </a:p>
           <a:p>
             <a:endParaRPr lang="en-US" dirty="0" smtClean="0"/>
@@ -5553,11 +6025,7 @@
           <a:p>
             <a:r>
               <a:rPr lang="en-US" dirty="0" smtClean="0"/>
-              <a:t>“Pull” – Download others’ changes from the server to your working copy</a:t>
-            </a:r>
-            <a:r>
-              <a:rPr lang="en-US" dirty="0" smtClean="0"/>
-              <a:t>.</a:t>
+              <a:t>“Pull” – Download others’ changes from the server to your working copy.</a:t>
             </a:r>
           </a:p>
           <a:p>
@@ -5565,7 +6033,6 @@
               <a:rPr lang="en-US" dirty="0" smtClean="0"/>
               <a:t>“Clone” – The initial time you copy a project from the server.</a:t>
             </a:r>
-            <a:endParaRPr lang="en-US" dirty="0" smtClean="0"/>
           </a:p>
         </p:txBody>
       </p:sp>
@@ -5797,11 +6264,7 @@
             <a:pPr lvl="1"/>
             <a:r>
               <a:rPr lang="en-US" dirty="0" smtClean="0"/>
-              <a:t>Social platform – the “Facebook” of coding</a:t>
-            </a:r>
-            <a:r>
-              <a:rPr lang="en-US" dirty="0" smtClean="0"/>
-              <a:t>.</a:t>
+              <a:t>Social platform – the “Facebook” of coding.</a:t>
             </a:r>
           </a:p>
           <a:p>

</xml_diff>